<commit_message>
fix typos in slides
</commit_message>
<xml_diff>
--- a/courses/cse3400-s2021/lecture8.pptx
+++ b/courses/cse3400-s2021/lecture8.pptx
@@ -7073,7 +7073,7 @@
                   <a:spcPct val="0"/>
                 </a:spcBef>
               </a:pPr>
-              <a:t>3/11/21</a:t>
+              <a:t>3/16/21</a:t>
             </a:fld>
             <a:endParaRPr lang="en-US" altLang="en-US">
               <a:latin typeface="Arial" panose="020B0604020202020204" pitchFamily="34" charset="0"/>
@@ -8998,7 +8998,7 @@
                   <a:spcPct val="0"/>
                 </a:spcBef>
               </a:pPr>
-              <a:t>3/11/21</a:t>
+              <a:t>3/16/21</a:t>
             </a:fld>
             <a:endParaRPr lang="en-US" altLang="en-US">
               <a:latin typeface="Arial" panose="020B0604020202020204" pitchFamily="34" charset="0"/>
@@ -9414,7 +9414,7 @@
                   <a:spcPct val="0"/>
                 </a:spcBef>
               </a:pPr>
-              <a:t>3/11/21</a:t>
+              <a:t>3/16/21</a:t>
             </a:fld>
             <a:endParaRPr lang="en-US" altLang="en-US">
               <a:latin typeface="Arial" panose="020B0604020202020204" pitchFamily="34" charset="0"/>
@@ -11339,7 +11339,7 @@
                   <a:spcPct val="0"/>
                 </a:spcBef>
               </a:pPr>
-              <a:t>3/11/21</a:t>
+              <a:t>3/16/21</a:t>
             </a:fld>
             <a:endParaRPr lang="en-US" altLang="en-US">
               <a:latin typeface="Arial" panose="020B0604020202020204" pitchFamily="34" charset="0"/>
@@ -17529,7 +17529,7 @@
             <a:pPr lvl="1"/>
             <a:r>
               <a:rPr lang="en-US" sz="2400" dirty="0"/>
-              <a:t>A message from Alice and a response form Bob (or vice versa).</a:t>
+              <a:t>A message from Alice and a response from Bob (or vice versa).</a:t>
             </a:r>
           </a:p>
           <a:p>
@@ -19201,8 +19201,8 @@
           </a:p>
         </p:txBody>
       </p:sp>
-      <mc:AlternateContent xmlns:mc="http://schemas.openxmlformats.org/markup-compatibility/2006" xmlns:a14="http://schemas.microsoft.com/office/drawing/2010/main">
-        <mc:Choice Requires="a14">
+      <mc:AlternateContent xmlns:mc="http://schemas.openxmlformats.org/markup-compatibility/2006">
+        <mc:Choice xmlns:a14="http://schemas.microsoft.com/office/drawing/2010/main" Requires="a14">
           <p:sp>
             <p:nvSpPr>
               <p:cNvPr id="3" name="Content Placeholder 2"/>
@@ -19238,42 +19238,40 @@
                       </a:rPr>
                       <m:t>𝐼𝑛𝑖𝑡</m:t>
                     </m:r>
+                    <m:d>
+                      <m:dPr>
+                        <m:ctrlPr>
+                          <a:rPr lang="en-US" sz="2400" i="1" dirty="0" smtClean="0">
+                            <a:latin typeface="Cambria Math" panose="02040503050406030204" pitchFamily="18" charset="0"/>
+                          </a:rPr>
+                        </m:ctrlPr>
+                      </m:dPr>
+                      <m:e>
+                        <m:r>
+                          <a:rPr lang="en-US" sz="2400" i="1" dirty="0" smtClean="0">
+                            <a:latin typeface="Cambria Math" panose="02040503050406030204" pitchFamily="18" charset="0"/>
+                          </a:rPr>
+                          <m:t>𝑘</m:t>
+                        </m:r>
+                      </m:e>
+                    </m:d>
                     <m:r>
-                      <a:rPr lang="en-US" sz="2400" i="1" dirty="0" smtClean="0">
+                      <a:rPr lang="en-US" sz="2400" b="0" i="1" dirty="0" smtClean="0">
                         <a:latin typeface="Cambria Math" panose="02040503050406030204" pitchFamily="18" charset="0"/>
                       </a:rPr>
-                      <m:t>(</m:t>
-                    </m:r>
-                    <m:r>
-                      <a:rPr lang="en-US" sz="2400" i="1" dirty="0" smtClean="0">
-                        <a:latin typeface="Cambria Math" panose="02040503050406030204" pitchFamily="18" charset="0"/>
-                      </a:rPr>
-                      <m:t>𝑘</m:t>
-                    </m:r>
-                    <m:r>
-                      <a:rPr lang="en-US" sz="2400" i="1" dirty="0" smtClean="0">
-                        <a:latin typeface="Cambria Math" panose="02040503050406030204" pitchFamily="18" charset="0"/>
-                      </a:rPr>
-                      <m:t>)</m:t>
+                      <m:t>: </m:t>
                     </m:r>
                   </m:oMath>
                 </a14:m>
                 <a:r>
-                  <a:rPr lang="en-US" sz="2400" i="1" dirty="0"/>
-                  <a:t>  </a:t>
-                </a:r>
-                <a:r>
                   <a:rPr lang="en-US" sz="2400" dirty="0"/>
-                  <a:t>[Initialize Alice/Bob with secret key </a:t>
+                  <a:t>Initialize Alice/Bob with secret key </a:t>
                 </a:r>
                 <a:r>
                   <a:rPr lang="en-US" sz="2400" i="1" dirty="0"/>
                   <a:t>k</a:t>
                 </a:r>
-                <a:r>
-                  <a:rPr lang="en-US" sz="2400" dirty="0"/>
-                  <a:t>]</a:t>
-                </a:r>
+                <a:endParaRPr lang="en-US" sz="2400" dirty="0"/>
               </a:p>
               <a:p>
                 <a:pPr lvl="1"/>
@@ -19471,7 +19469,7 @@
             </p:txBody>
           </p:sp>
         </mc:Choice>
-        <mc:Fallback xmlns="">
+        <mc:Fallback>
           <p:sp>
             <p:nvSpPr>
               <p:cNvPr id="3" name="Content Placeholder 2"/>
@@ -19490,7 +19488,7 @@
               <a:blipFill>
                 <a:blip r:embed="rId2"/>
                 <a:stretch>
-                  <a:fillRect l="-1244" t="-1224"/>
+                  <a:fillRect l="-1370" t="-1272"/>
                 </a:stretch>
               </a:blipFill>
             </p:spPr>
@@ -23107,7 +23105,7 @@
         <p:spPr bwMode="auto">
           <a:xfrm>
             <a:off x="3563889" y="4085042"/>
-            <a:ext cx="1872207" cy="578569"/>
+            <a:ext cx="2155203" cy="578569"/>
           </a:xfrm>
           <a:prstGeom prst="roundRect">
             <a:avLst/>
@@ -23146,60 +23144,53 @@
           <a:lstStyle/>
           <a:p>
             <a:r>
-              <a:rPr lang="en-US" altLang="en-US" sz="1600" i="1">
+              <a:rPr lang="en-US" altLang="en-US" sz="1600" i="1" dirty="0">
                 <a:latin typeface="Times New Roman" panose="02020603050405020304" pitchFamily="18" charset="0"/>
                 <a:cs typeface="Times New Roman" panose="02020603050405020304" pitchFamily="18" charset="0"/>
               </a:rPr>
               <a:t>N</a:t>
             </a:r>
             <a:r>
-              <a:rPr lang="en-US" altLang="en-US" sz="1600" i="1" baseline="-25000">
+              <a:rPr lang="en-US" altLang="en-US" sz="1600" i="1" baseline="-25000" dirty="0">
                 <a:latin typeface="Times New Roman" panose="02020603050405020304" pitchFamily="18" charset="0"/>
                 <a:cs typeface="Times New Roman" panose="02020603050405020304" pitchFamily="18" charset="0"/>
               </a:rPr>
-              <a:t>a</a:t>
+              <a:t>A</a:t>
             </a:r>
             <a:r>
-              <a:rPr lang="en-US" altLang="en-US" sz="1600" i="1">
+              <a:rPr lang="en-US" altLang="en-US" sz="1600" i="1" dirty="0">
                 <a:latin typeface="Times New Roman" panose="02020603050405020304" pitchFamily="18" charset="0"/>
                 <a:cs typeface="Times New Roman" panose="02020603050405020304" pitchFamily="18" charset="0"/>
               </a:rPr>
-              <a:t>, </a:t>
+              <a:t> and N</a:t>
             </a:r>
             <a:r>
-              <a:rPr lang="en-US" altLang="en-US" sz="1600" i="1" err="1">
+              <a:rPr lang="en-US" altLang="en-US" sz="1600" i="1" baseline="-25000" dirty="0">
                 <a:latin typeface="Times New Roman" panose="02020603050405020304" pitchFamily="18" charset="0"/>
                 <a:cs typeface="Times New Roman" panose="02020603050405020304" pitchFamily="18" charset="0"/>
               </a:rPr>
-              <a:t>N</a:t>
+              <a:t>B</a:t>
             </a:r>
             <a:r>
-              <a:rPr lang="en-US" altLang="en-US" sz="1600" i="1" baseline="-25000" err="1">
-                <a:latin typeface="Times New Roman" panose="02020603050405020304" pitchFamily="18" charset="0"/>
-                <a:cs typeface="Times New Roman" panose="02020603050405020304" pitchFamily="18" charset="0"/>
-              </a:rPr>
-              <a:t>b</a:t>
-            </a:r>
-            <a:r>
-              <a:rPr lang="en-US" altLang="en-US" sz="1600" i="1">
+              <a:rPr lang="en-US" altLang="en-US" sz="1600" i="1" dirty="0">
                 <a:latin typeface="Times New Roman" panose="02020603050405020304" pitchFamily="18" charset="0"/>
                 <a:cs typeface="Times New Roman" panose="02020603050405020304" pitchFamily="18" charset="0"/>
               </a:rPr>
               <a:t> </a:t>
             </a:r>
             <a:r>
-              <a:rPr lang="en-US" altLang="en-US" sz="1600" i="1"/>
+              <a:rPr lang="en-US" altLang="en-US" sz="1600" i="1" dirty="0"/>
               <a:t>- </a:t>
             </a:r>
             <a:r>
-              <a:rPr lang="en-US" altLang="en-US" sz="1600"/>
+              <a:rPr lang="en-US" altLang="en-US" sz="1600" dirty="0"/>
               <a:t>randomly chosen </a:t>
             </a:r>
             <a:r>
-              <a:rPr lang="en-US" altLang="en-US" sz="1600" i="1" err="1"/>
+              <a:rPr lang="en-US" altLang="en-US" sz="1600" i="1" dirty="0"/>
               <a:t>nonces</a:t>
             </a:r>
-            <a:endParaRPr kumimoji="0" lang="he-IL" sz="1600" b="0" i="0" u="none" strike="noStrike" cap="none" normalizeH="0" baseline="0">
+            <a:endParaRPr kumimoji="0" lang="he-IL" sz="1600" b="0" i="0" u="none" strike="noStrike" cap="none" normalizeH="0" baseline="0" dirty="0">
               <a:ln>
                 <a:noFill/>
               </a:ln>
@@ -23303,8 +23294,8 @@
         </p:nvCxnSpPr>
         <p:spPr bwMode="auto">
           <a:xfrm flipH="1" flipV="1">
-            <a:off x="2843808" y="3684173"/>
-            <a:ext cx="720081" cy="690154"/>
+            <a:off x="2843809" y="3684173"/>
+            <a:ext cx="720080" cy="690154"/>
           </a:xfrm>
           <a:prstGeom prst="straightConnector1">
             <a:avLst/>
@@ -24156,7 +24147,7 @@
                 <a:latin typeface="Times New Roman" panose="02020603050405020304" pitchFamily="18" charset="0"/>
                 <a:cs typeface="Times New Roman" panose="02020603050405020304" pitchFamily="18" charset="0"/>
               </a:rPr>
-              <a:t>b</a:t>
+              <a:t>B</a:t>
             </a:r>
             <a:r>
               <a:rPr lang="en-US" altLang="en-US" sz="2600" dirty="0"/>
@@ -24196,7 +24187,7 @@
                 <a:latin typeface="Times New Roman" panose="02020603050405020304" pitchFamily="18" charset="0"/>
                 <a:cs typeface="Times New Roman" panose="02020603050405020304" pitchFamily="18" charset="0"/>
               </a:rPr>
-              <a:t>b</a:t>
+              <a:t>B</a:t>
             </a:r>
             <a:r>
               <a:rPr lang="en-US" altLang="en-US" sz="2600" i="1" dirty="0">
@@ -32429,8 +32420,13 @@
             </a:pPr>
             <a:r>
               <a:rPr lang="en-US" altLang="en-US" sz="2400" dirty="0"/>
-              <a:t>Use MAC rather than encryption to  authenticate</a:t>
+              <a:t>Use MAC rather than encryption </a:t>
             </a:r>
+            <a:r>
+              <a:rPr lang="en-US" altLang="en-US" sz="2400"/>
+              <a:t>to authenticate</a:t>
+            </a:r>
+            <a:endParaRPr lang="en-US" altLang="en-US" sz="2400" dirty="0"/>
           </a:p>
           <a:p>
             <a:pPr eaLnBrk="1" hangingPunct="1">

</xml_diff>